<commit_message>
Updating ppt with business understanding and added null values calc in notebook
Updating ppt with business understanding and added null values calc in notebook
</commit_message>
<xml_diff>
--- a/Credit EDA/Credit EDA Case Study.pptx
+++ b/Credit EDA/Credit EDA Case Study.pptx
@@ -6,18 +6,20 @@
   </p:sldMasterIdLst>
   <p:sldIdLst>
     <p:sldId id="256" r:id="rId2"/>
-    <p:sldId id="257" r:id="rId3"/>
-    <p:sldId id="258" r:id="rId4"/>
-    <p:sldId id="259" r:id="rId5"/>
-    <p:sldId id="266" r:id="rId6"/>
-    <p:sldId id="260" r:id="rId7"/>
-    <p:sldId id="267" r:id="rId8"/>
-    <p:sldId id="261" r:id="rId9"/>
-    <p:sldId id="262" r:id="rId10"/>
-    <p:sldId id="268" r:id="rId11"/>
-    <p:sldId id="263" r:id="rId12"/>
-    <p:sldId id="264" r:id="rId13"/>
-    <p:sldId id="265" r:id="rId14"/>
+    <p:sldId id="258" r:id="rId3"/>
+    <p:sldId id="269" r:id="rId4"/>
+    <p:sldId id="270" r:id="rId5"/>
+    <p:sldId id="259" r:id="rId6"/>
+    <p:sldId id="271" r:id="rId7"/>
+    <p:sldId id="266" r:id="rId8"/>
+    <p:sldId id="260" r:id="rId9"/>
+    <p:sldId id="267" r:id="rId10"/>
+    <p:sldId id="261" r:id="rId11"/>
+    <p:sldId id="262" r:id="rId12"/>
+    <p:sldId id="268" r:id="rId13"/>
+    <p:sldId id="263" r:id="rId14"/>
+    <p:sldId id="264" r:id="rId15"/>
+    <p:sldId id="265" r:id="rId16"/>
   </p:sldIdLst>
   <p:sldSz cx="12192000" cy="6858000"/>
   <p:notesSz cx="6858000" cy="9144000"/>
@@ -116,6 +118,11 @@
       </a:defRPr>
     </a:lvl9pPr>
   </p:defaultTextStyle>
+  <p:extLst>
+    <p:ext uri="{EFAFB233-063F-42B5-8137-9DF3F51BA10A}">
+      <p15:sldGuideLst xmlns:p15="http://schemas.microsoft.com/office/powerpoint/2012/main"/>
+    </p:ext>
+  </p:extLst>
 </p:presentation>
 </file>
 
@@ -268,7 +275,7 @@
           <a:p>
             <a:fld id="{72345051-2045-45DA-935E-2E3CA1A69ADC}" type="datetimeFigureOut">
               <a:rPr lang="en-US" smtClean="0"/>
-              <a:t>6/6/2020</a:t>
+              <a:t>6/7/2020</a:t>
             </a:fld>
             <a:endParaRPr lang="en-US"/>
           </a:p>
@@ -468,7 +475,7 @@
           <a:p>
             <a:fld id="{72345051-2045-45DA-935E-2E3CA1A69ADC}" type="datetimeFigureOut">
               <a:rPr lang="en-US" smtClean="0"/>
-              <a:t>6/6/2020</a:t>
+              <a:t>6/7/2020</a:t>
             </a:fld>
             <a:endParaRPr lang="en-US"/>
           </a:p>
@@ -678,7 +685,7 @@
           <a:p>
             <a:fld id="{72345051-2045-45DA-935E-2E3CA1A69ADC}" type="datetimeFigureOut">
               <a:rPr lang="en-US" smtClean="0"/>
-              <a:t>6/6/2020</a:t>
+              <a:t>6/7/2020</a:t>
             </a:fld>
             <a:endParaRPr lang="en-US"/>
           </a:p>
@@ -878,7 +885,7 @@
           <a:p>
             <a:fld id="{72345051-2045-45DA-935E-2E3CA1A69ADC}" type="datetimeFigureOut">
               <a:rPr lang="en-US" smtClean="0"/>
-              <a:t>6/6/2020</a:t>
+              <a:t>6/7/2020</a:t>
             </a:fld>
             <a:endParaRPr lang="en-US"/>
           </a:p>
@@ -1154,7 +1161,7 @@
           <a:p>
             <a:fld id="{72345051-2045-45DA-935E-2E3CA1A69ADC}" type="datetimeFigureOut">
               <a:rPr lang="en-US" smtClean="0"/>
-              <a:t>6/6/2020</a:t>
+              <a:t>6/7/2020</a:t>
             </a:fld>
             <a:endParaRPr lang="en-US"/>
           </a:p>
@@ -1422,7 +1429,7 @@
           <a:p>
             <a:fld id="{72345051-2045-45DA-935E-2E3CA1A69ADC}" type="datetimeFigureOut">
               <a:rPr lang="en-US" smtClean="0"/>
-              <a:t>6/6/2020</a:t>
+              <a:t>6/7/2020</a:t>
             </a:fld>
             <a:endParaRPr lang="en-US"/>
           </a:p>
@@ -1837,7 +1844,7 @@
           <a:p>
             <a:fld id="{72345051-2045-45DA-935E-2E3CA1A69ADC}" type="datetimeFigureOut">
               <a:rPr lang="en-US" smtClean="0"/>
-              <a:t>6/6/2020</a:t>
+              <a:t>6/7/2020</a:t>
             </a:fld>
             <a:endParaRPr lang="en-US"/>
           </a:p>
@@ -1979,7 +1986,7 @@
           <a:p>
             <a:fld id="{72345051-2045-45DA-935E-2E3CA1A69ADC}" type="datetimeFigureOut">
               <a:rPr lang="en-US" smtClean="0"/>
-              <a:t>6/6/2020</a:t>
+              <a:t>6/7/2020</a:t>
             </a:fld>
             <a:endParaRPr lang="en-US"/>
           </a:p>
@@ -2092,7 +2099,7 @@
           <a:p>
             <a:fld id="{72345051-2045-45DA-935E-2E3CA1A69ADC}" type="datetimeFigureOut">
               <a:rPr lang="en-US" smtClean="0"/>
-              <a:t>6/6/2020</a:t>
+              <a:t>6/7/2020</a:t>
             </a:fld>
             <a:endParaRPr lang="en-US"/>
           </a:p>
@@ -2405,7 +2412,7 @@
           <a:p>
             <a:fld id="{72345051-2045-45DA-935E-2E3CA1A69ADC}" type="datetimeFigureOut">
               <a:rPr lang="en-US" smtClean="0"/>
-              <a:t>6/6/2020</a:t>
+              <a:t>6/7/2020</a:t>
             </a:fld>
             <a:endParaRPr lang="en-US"/>
           </a:p>
@@ -2694,7 +2701,7 @@
           <a:p>
             <a:fld id="{72345051-2045-45DA-935E-2E3CA1A69ADC}" type="datetimeFigureOut">
               <a:rPr lang="en-US" smtClean="0"/>
-              <a:t>6/6/2020</a:t>
+              <a:t>6/7/2020</a:t>
             </a:fld>
             <a:endParaRPr lang="en-US"/>
           </a:p>
@@ -2937,7 +2944,7 @@
           <a:p>
             <a:fld id="{72345051-2045-45DA-935E-2E3CA1A69ADC}" type="datetimeFigureOut">
               <a:rPr lang="en-US" smtClean="0"/>
-              <a:t>6/6/2020</a:t>
+              <a:t>6/7/2020</a:t>
             </a:fld>
             <a:endParaRPr lang="en-US"/>
           </a:p>
@@ -3514,18 +3521,18 @@
       </p:grpSpPr>
       <p:sp>
         <p:nvSpPr>
-          <p:cNvPr id="4" name="Title 3">
-            <a:extLst>
-              <a:ext uri="{FF2B5EF4-FFF2-40B4-BE49-F238E27FC236}">
-                <a16:creationId xmlns:a16="http://schemas.microsoft.com/office/drawing/2014/main" id="{1B2C9C62-10D5-4206-BFF3-A6891F17C1EF}"/>
-              </a:ext>
-            </a:extLst>
-          </p:cNvPr>
-          <p:cNvSpPr>
-            <a:spLocks noGrp="1"/>
-          </p:cNvSpPr>
-          <p:nvPr>
-            <p:ph type="ctrTitle"/>
+          <p:cNvPr id="2" name="Title 1">
+            <a:extLst>
+              <a:ext uri="{FF2B5EF4-FFF2-40B4-BE49-F238E27FC236}">
+                <a16:creationId xmlns:a16="http://schemas.microsoft.com/office/drawing/2014/main" id="{A25CEBA9-6D34-432E-9ACE-755890EE221B}"/>
+              </a:ext>
+            </a:extLst>
+          </p:cNvPr>
+          <p:cNvSpPr>
+            <a:spLocks noGrp="1"/>
+          </p:cNvSpPr>
+          <p:nvPr>
+            <p:ph type="title"/>
           </p:nvPr>
         </p:nvSpPr>
         <p:spPr/>
@@ -3535,40 +3542,40 @@
           <a:p>
             <a:r>
               <a:rPr lang="en-IN" b="1" dirty="0"/>
-              <a:t>Data Analysis</a:t>
-            </a:r>
-          </a:p>
-        </p:txBody>
-      </p:sp>
-      <p:sp>
-        <p:nvSpPr>
-          <p:cNvPr id="5" name="Subtitle 4">
-            <a:extLst>
-              <a:ext uri="{FF2B5EF4-FFF2-40B4-BE49-F238E27FC236}">
-                <a16:creationId xmlns:a16="http://schemas.microsoft.com/office/drawing/2014/main" id="{00C2C3E8-55CF-42B1-B492-3C7B019DE870}"/>
-              </a:ext>
-            </a:extLst>
-          </p:cNvPr>
-          <p:cNvSpPr>
-            <a:spLocks noGrp="1"/>
-          </p:cNvSpPr>
-          <p:nvPr>
-            <p:ph type="subTitle" idx="1"/>
-          </p:nvPr>
-        </p:nvSpPr>
-        <p:spPr/>
-        <p:txBody>
-          <a:bodyPr/>
-          <a:lstStyle/>
-          <a:p>
-            <a:endParaRPr lang="en-IN" dirty="0"/>
+              <a:t>Handling Outliers</a:t>
+            </a:r>
+          </a:p>
+        </p:txBody>
+      </p:sp>
+      <p:sp>
+        <p:nvSpPr>
+          <p:cNvPr id="3" name="Content Placeholder 2">
+            <a:extLst>
+              <a:ext uri="{FF2B5EF4-FFF2-40B4-BE49-F238E27FC236}">
+                <a16:creationId xmlns:a16="http://schemas.microsoft.com/office/drawing/2014/main" id="{D1B3FFF8-53B2-4343-AEA2-D3E4EEDFAECF}"/>
+              </a:ext>
+            </a:extLst>
+          </p:cNvPr>
+          <p:cNvSpPr>
+            <a:spLocks noGrp="1"/>
+          </p:cNvSpPr>
+          <p:nvPr>
+            <p:ph idx="1"/>
+          </p:nvPr>
+        </p:nvSpPr>
+        <p:spPr/>
+        <p:txBody>
+          <a:bodyPr/>
+          <a:lstStyle/>
+          <a:p>
+            <a:endParaRPr lang="en-IN"/>
           </a:p>
         </p:txBody>
       </p:sp>
     </p:spTree>
     <p:extLst>
       <p:ext uri="{BB962C8B-B14F-4D97-AF65-F5344CB8AC3E}">
-        <p14:creationId xmlns:p14="http://schemas.microsoft.com/office/powerpoint/2010/main" val="142857952"/>
+        <p14:creationId xmlns:p14="http://schemas.microsoft.com/office/powerpoint/2010/main" val="1382689733"/>
       </p:ext>
     </p:extLst>
   </p:cSld>
@@ -3600,7 +3607,7 @@
           <p:cNvPr id="2" name="Title 1">
             <a:extLst>
               <a:ext uri="{FF2B5EF4-FFF2-40B4-BE49-F238E27FC236}">
-                <a16:creationId xmlns:a16="http://schemas.microsoft.com/office/drawing/2014/main" id="{37A81147-706A-49C0-95B1-C238AE5B54C1}"/>
+                <a16:creationId xmlns:a16="http://schemas.microsoft.com/office/drawing/2014/main" id="{12D99B56-5A3D-4D2C-A097-8AB57861B845}"/>
               </a:ext>
             </a:extLst>
           </p:cNvPr>
@@ -3618,7 +3625,7 @@
           <a:p>
             <a:r>
               <a:rPr lang="en-IN" b="1" dirty="0"/>
-              <a:t>Univariate/Bivariate Analysis</a:t>
+              <a:t>Data Imbalance</a:t>
             </a:r>
           </a:p>
         </p:txBody>
@@ -3628,7 +3635,7 @@
           <p:cNvPr id="3" name="Content Placeholder 2">
             <a:extLst>
               <a:ext uri="{FF2B5EF4-FFF2-40B4-BE49-F238E27FC236}">
-                <a16:creationId xmlns:a16="http://schemas.microsoft.com/office/drawing/2014/main" id="{6B83837D-723F-4C33-92D8-FBF53FB08BFB}"/>
+                <a16:creationId xmlns:a16="http://schemas.microsoft.com/office/drawing/2014/main" id="{D915CF85-E928-42A0-BB1E-F923A43875BB}"/>
               </a:ext>
             </a:extLst>
           </p:cNvPr>
@@ -3651,7 +3658,7 @@
     </p:spTree>
     <p:extLst>
       <p:ext uri="{BB962C8B-B14F-4D97-AF65-F5344CB8AC3E}">
-        <p14:creationId xmlns:p14="http://schemas.microsoft.com/office/powerpoint/2010/main" val="2365439990"/>
+        <p14:creationId xmlns:p14="http://schemas.microsoft.com/office/powerpoint/2010/main" val="2842010195"/>
       </p:ext>
     </p:extLst>
   </p:cSld>
@@ -3680,6 +3687,172 @@
       </p:grpSpPr>
       <p:sp>
         <p:nvSpPr>
+          <p:cNvPr id="4" name="Title 3">
+            <a:extLst>
+              <a:ext uri="{FF2B5EF4-FFF2-40B4-BE49-F238E27FC236}">
+                <a16:creationId xmlns:a16="http://schemas.microsoft.com/office/drawing/2014/main" id="{1B2C9C62-10D5-4206-BFF3-A6891F17C1EF}"/>
+              </a:ext>
+            </a:extLst>
+          </p:cNvPr>
+          <p:cNvSpPr>
+            <a:spLocks noGrp="1"/>
+          </p:cNvSpPr>
+          <p:nvPr>
+            <p:ph type="ctrTitle"/>
+          </p:nvPr>
+        </p:nvSpPr>
+        <p:spPr/>
+        <p:txBody>
+          <a:bodyPr/>
+          <a:lstStyle/>
+          <a:p>
+            <a:r>
+              <a:rPr lang="en-IN" b="1" dirty="0"/>
+              <a:t>Data Analysis</a:t>
+            </a:r>
+          </a:p>
+        </p:txBody>
+      </p:sp>
+      <p:sp>
+        <p:nvSpPr>
+          <p:cNvPr id="5" name="Subtitle 4">
+            <a:extLst>
+              <a:ext uri="{FF2B5EF4-FFF2-40B4-BE49-F238E27FC236}">
+                <a16:creationId xmlns:a16="http://schemas.microsoft.com/office/drawing/2014/main" id="{00C2C3E8-55CF-42B1-B492-3C7B019DE870}"/>
+              </a:ext>
+            </a:extLst>
+          </p:cNvPr>
+          <p:cNvSpPr>
+            <a:spLocks noGrp="1"/>
+          </p:cNvSpPr>
+          <p:nvPr>
+            <p:ph type="subTitle" idx="1"/>
+          </p:nvPr>
+        </p:nvSpPr>
+        <p:spPr/>
+        <p:txBody>
+          <a:bodyPr/>
+          <a:lstStyle/>
+          <a:p>
+            <a:endParaRPr lang="en-IN" dirty="0"/>
+          </a:p>
+        </p:txBody>
+      </p:sp>
+    </p:spTree>
+    <p:extLst>
+      <p:ext uri="{BB962C8B-B14F-4D97-AF65-F5344CB8AC3E}">
+        <p14:creationId xmlns:p14="http://schemas.microsoft.com/office/powerpoint/2010/main" val="142857952"/>
+      </p:ext>
+    </p:extLst>
+  </p:cSld>
+  <p:clrMapOvr>
+    <a:masterClrMapping/>
+  </p:clrMapOvr>
+</p:sld>
+</file>
+
+<file path=ppt/slides/slide13.xml><?xml version="1.0" encoding="utf-8"?>
+<p:sld xmlns:a="http://schemas.openxmlformats.org/drawingml/2006/main" xmlns:r="http://schemas.openxmlformats.org/officeDocument/2006/relationships" xmlns:p="http://schemas.openxmlformats.org/presentationml/2006/main">
+  <p:cSld>
+    <p:spTree>
+      <p:nvGrpSpPr>
+        <p:cNvPr id="1" name=""/>
+        <p:cNvGrpSpPr/>
+        <p:nvPr/>
+      </p:nvGrpSpPr>
+      <p:grpSpPr>
+        <a:xfrm>
+          <a:off x="0" y="0"/>
+          <a:ext cx="0" cy="0"/>
+          <a:chOff x="0" y="0"/>
+          <a:chExt cx="0" cy="0"/>
+        </a:xfrm>
+      </p:grpSpPr>
+      <p:sp>
+        <p:nvSpPr>
+          <p:cNvPr id="2" name="Title 1">
+            <a:extLst>
+              <a:ext uri="{FF2B5EF4-FFF2-40B4-BE49-F238E27FC236}">
+                <a16:creationId xmlns:a16="http://schemas.microsoft.com/office/drawing/2014/main" id="{37A81147-706A-49C0-95B1-C238AE5B54C1}"/>
+              </a:ext>
+            </a:extLst>
+          </p:cNvPr>
+          <p:cNvSpPr>
+            <a:spLocks noGrp="1"/>
+          </p:cNvSpPr>
+          <p:nvPr>
+            <p:ph type="title"/>
+          </p:nvPr>
+        </p:nvSpPr>
+        <p:spPr/>
+        <p:txBody>
+          <a:bodyPr/>
+          <a:lstStyle/>
+          <a:p>
+            <a:r>
+              <a:rPr lang="en-IN" b="1" dirty="0"/>
+              <a:t>Univariate/Bivariate Analysis</a:t>
+            </a:r>
+          </a:p>
+        </p:txBody>
+      </p:sp>
+      <p:sp>
+        <p:nvSpPr>
+          <p:cNvPr id="3" name="Content Placeholder 2">
+            <a:extLst>
+              <a:ext uri="{FF2B5EF4-FFF2-40B4-BE49-F238E27FC236}">
+                <a16:creationId xmlns:a16="http://schemas.microsoft.com/office/drawing/2014/main" id="{6B83837D-723F-4C33-92D8-FBF53FB08BFB}"/>
+              </a:ext>
+            </a:extLst>
+          </p:cNvPr>
+          <p:cNvSpPr>
+            <a:spLocks noGrp="1"/>
+          </p:cNvSpPr>
+          <p:nvPr>
+            <p:ph idx="1"/>
+          </p:nvPr>
+        </p:nvSpPr>
+        <p:spPr/>
+        <p:txBody>
+          <a:bodyPr/>
+          <a:lstStyle/>
+          <a:p>
+            <a:endParaRPr lang="en-IN"/>
+          </a:p>
+        </p:txBody>
+      </p:sp>
+    </p:spTree>
+    <p:extLst>
+      <p:ext uri="{BB962C8B-B14F-4D97-AF65-F5344CB8AC3E}">
+        <p14:creationId xmlns:p14="http://schemas.microsoft.com/office/powerpoint/2010/main" val="2365439990"/>
+      </p:ext>
+    </p:extLst>
+  </p:cSld>
+  <p:clrMapOvr>
+    <a:masterClrMapping/>
+  </p:clrMapOvr>
+</p:sld>
+</file>
+
+<file path=ppt/slides/slide14.xml><?xml version="1.0" encoding="utf-8"?>
+<p:sld xmlns:a="http://schemas.openxmlformats.org/drawingml/2006/main" xmlns:r="http://schemas.openxmlformats.org/officeDocument/2006/relationships" xmlns:p="http://schemas.openxmlformats.org/presentationml/2006/main">
+  <p:cSld>
+    <p:spTree>
+      <p:nvGrpSpPr>
+        <p:cNvPr id="1" name=""/>
+        <p:cNvGrpSpPr/>
+        <p:nvPr/>
+      </p:nvGrpSpPr>
+      <p:grpSpPr>
+        <a:xfrm>
+          <a:off x="0" y="0"/>
+          <a:ext cx="0" cy="0"/>
+          <a:chOff x="0" y="0"/>
+          <a:chExt cx="0" cy="0"/>
+        </a:xfrm>
+      </p:grpSpPr>
+      <p:sp>
+        <p:nvSpPr>
           <p:cNvPr id="2" name="Title 1">
             <a:extLst>
               <a:ext uri="{FF2B5EF4-FFF2-40B4-BE49-F238E27FC236}">
@@ -3745,7 +3918,7 @@
 </p:sld>
 </file>
 
-<file path=ppt/slides/slide13.xml><?xml version="1.0" encoding="utf-8"?>
+<file path=ppt/slides/slide15.xml><?xml version="1.0" encoding="utf-8"?>
 <p:sld xmlns:a="http://schemas.openxmlformats.org/drawingml/2006/main" xmlns:r="http://schemas.openxmlformats.org/officeDocument/2006/relationships" xmlns:p="http://schemas.openxmlformats.org/presentationml/2006/main">
   <p:cSld>
     <p:spTree>
@@ -3847,10 +4020,131 @@
       </p:grpSpPr>
       <p:sp>
         <p:nvSpPr>
+          <p:cNvPr id="3" name="Content Placeholder 2">
+            <a:extLst>
+              <a:ext uri="{FF2B5EF4-FFF2-40B4-BE49-F238E27FC236}">
+                <a16:creationId xmlns:a16="http://schemas.microsoft.com/office/drawing/2014/main" id="{AD81B1B7-0932-4D4D-B84E-BE67790EA0DD}"/>
+              </a:ext>
+            </a:extLst>
+          </p:cNvPr>
+          <p:cNvSpPr>
+            <a:spLocks noGrp="1"/>
+          </p:cNvSpPr>
+          <p:nvPr>
+            <p:ph sz="half" idx="1"/>
+          </p:nvPr>
+        </p:nvSpPr>
+        <p:spPr/>
+        <p:txBody>
+          <a:bodyPr/>
+          <a:lstStyle/>
+          <a:p>
+            <a:r>
+              <a:rPr lang="en-US" dirty="0" err="1"/>
+              <a:t>Analyse</a:t>
+            </a:r>
+            <a:r>
+              <a:rPr lang="en-US" dirty="0"/>
+              <a:t> the patterns present in the data.</a:t>
+            </a:r>
+          </a:p>
+          <a:p>
+            <a:r>
+              <a:rPr lang="en-US" dirty="0"/>
+              <a:t>Ensure that the applicants are capable of repaying the loan are not rejected.</a:t>
+            </a:r>
+          </a:p>
+          <a:p>
+            <a:endParaRPr lang="en-IN" dirty="0"/>
+          </a:p>
+        </p:txBody>
+      </p:sp>
+      <p:sp>
+        <p:nvSpPr>
+          <p:cNvPr id="4" name="Content Placeholder 3">
+            <a:extLst>
+              <a:ext uri="{FF2B5EF4-FFF2-40B4-BE49-F238E27FC236}">
+                <a16:creationId xmlns:a16="http://schemas.microsoft.com/office/drawing/2014/main" id="{6B920D9F-73A4-4FB4-84C1-92244DE223A0}"/>
+              </a:ext>
+            </a:extLst>
+          </p:cNvPr>
+          <p:cNvSpPr>
+            <a:spLocks noGrp="1"/>
+          </p:cNvSpPr>
+          <p:nvPr>
+            <p:ph sz="half" idx="2"/>
+          </p:nvPr>
+        </p:nvSpPr>
+        <p:spPr>
+          <a:xfrm>
+            <a:off x="6781800" y="5900341"/>
+            <a:ext cx="4191000" cy="553243"/>
+          </a:xfrm>
+        </p:spPr>
+        <p:txBody>
+          <a:bodyPr/>
+          <a:lstStyle/>
+          <a:p>
+            <a:pPr marL="0" indent="0">
+              <a:buNone/>
+            </a:pPr>
+            <a:r>
+              <a:rPr lang="en-IN" b="1" u="sng" dirty="0"/>
+              <a:t>Use </a:t>
+            </a:r>
+            <a:r>
+              <a:rPr lang="en-IN" b="1" u="sng" dirty="0" err="1"/>
+              <a:t>PowerBI</a:t>
+            </a:r>
+            <a:r>
+              <a:rPr lang="en-IN" b="1" u="sng" dirty="0"/>
+              <a:t> later</a:t>
+            </a:r>
+          </a:p>
+          <a:p>
+            <a:pPr marL="0" indent="0">
+              <a:buNone/>
+            </a:pPr>
+            <a:endParaRPr lang="en-IN" b="1" u="sng" dirty="0"/>
+          </a:p>
+        </p:txBody>
+      </p:sp>
+      <p:pic>
+        <p:nvPicPr>
+          <p:cNvPr id="5" name="Picture 4">
+            <a:extLst>
+              <a:ext uri="{FF2B5EF4-FFF2-40B4-BE49-F238E27FC236}">
+                <a16:creationId xmlns:a16="http://schemas.microsoft.com/office/drawing/2014/main" id="{ECABAA3F-1635-422A-BFCC-0CEBE4F1CE33}"/>
+              </a:ext>
+            </a:extLst>
+          </p:cNvPr>
+          <p:cNvPicPr>
+            <a:picLocks noChangeAspect="1"/>
+          </p:cNvPicPr>
+          <p:nvPr/>
+        </p:nvPicPr>
+        <p:blipFill>
+          <a:blip r:embed="rId2"/>
+          <a:stretch>
+            <a:fillRect/>
+          </a:stretch>
+        </p:blipFill>
+        <p:spPr>
+          <a:xfrm>
+            <a:off x="6344736" y="674292"/>
+            <a:ext cx="5347201" cy="4921250"/>
+          </a:xfrm>
+          <a:prstGeom prst="rect">
+            <a:avLst/>
+          </a:prstGeom>
+        </p:spPr>
+      </p:pic>
+      <p:sp>
+        <p:nvSpPr>
           <p:cNvPr id="2" name="Title 1">
             <a:extLst>
               <a:ext uri="{FF2B5EF4-FFF2-40B4-BE49-F238E27FC236}">
-                <a16:creationId xmlns:a16="http://schemas.microsoft.com/office/drawing/2014/main" id="{020539B0-B864-41CF-AC28-A37C3DC857CB}"/>
+                <a16:creationId xmlns:a16="http://schemas.microsoft.com/office/drawing/2014/main" id="{D090E0CA-8DC1-4B67-B661-E218171760E9}"/>
               </a:ext>
             </a:extLst>
           </p:cNvPr>
@@ -3870,41 +4164,16 @@
           <a:p>
             <a:r>
               <a:rPr lang="en-IN" b="1" dirty="0"/>
-              <a:t>Business Understanding</a:t>
+              <a:t>Business Understanding - Risks</a:t>
             </a:r>
             <a:endParaRPr lang="en-IN" dirty="0"/>
-          </a:p>
-        </p:txBody>
-      </p:sp>
-      <p:sp>
-        <p:nvSpPr>
-          <p:cNvPr id="3" name="Content Placeholder 2">
-            <a:extLst>
-              <a:ext uri="{FF2B5EF4-FFF2-40B4-BE49-F238E27FC236}">
-                <a16:creationId xmlns:a16="http://schemas.microsoft.com/office/drawing/2014/main" id="{798A5AAD-007D-4EC1-BDF8-C8B79BD83FC4}"/>
-              </a:ext>
-            </a:extLst>
-          </p:cNvPr>
-          <p:cNvSpPr>
-            <a:spLocks noGrp="1"/>
-          </p:cNvSpPr>
-          <p:nvPr>
-            <p:ph idx="1"/>
-          </p:nvPr>
-        </p:nvSpPr>
-        <p:spPr/>
-        <p:txBody>
-          <a:bodyPr/>
-          <a:lstStyle/>
-          <a:p>
-            <a:endParaRPr lang="en-IN"/>
           </a:p>
         </p:txBody>
       </p:sp>
     </p:spTree>
     <p:extLst>
       <p:ext uri="{BB962C8B-B14F-4D97-AF65-F5344CB8AC3E}">
-        <p14:creationId xmlns:p14="http://schemas.microsoft.com/office/powerpoint/2010/main" val="2629380977"/>
+        <p14:creationId xmlns:p14="http://schemas.microsoft.com/office/powerpoint/2010/main" val="2680564029"/>
       </p:ext>
     </p:extLst>
   </p:cSld>
@@ -3936,7 +4205,7 @@
           <p:cNvPr id="2" name="Title 1">
             <a:extLst>
               <a:ext uri="{FF2B5EF4-FFF2-40B4-BE49-F238E27FC236}">
-                <a16:creationId xmlns:a16="http://schemas.microsoft.com/office/drawing/2014/main" id="{D090E0CA-8DC1-4B67-B661-E218171760E9}"/>
+                <a16:creationId xmlns:a16="http://schemas.microsoft.com/office/drawing/2014/main" id="{020539B0-B864-41CF-AC28-A37C3DC857CB}"/>
               </a:ext>
             </a:extLst>
           </p:cNvPr>
@@ -3956,7 +4225,7 @@
           <a:p>
             <a:r>
               <a:rPr lang="en-IN" b="1" dirty="0"/>
-              <a:t>Business Objectives</a:t>
+              <a:t>Business Understanding - Decisions</a:t>
             </a:r>
             <a:endParaRPr lang="en-IN" dirty="0"/>
           </a:p>
@@ -3964,18 +4233,18 @@
       </p:sp>
       <p:sp>
         <p:nvSpPr>
-          <p:cNvPr id="3" name="Content Placeholder 2">
-            <a:extLst>
-              <a:ext uri="{FF2B5EF4-FFF2-40B4-BE49-F238E27FC236}">
-                <a16:creationId xmlns:a16="http://schemas.microsoft.com/office/drawing/2014/main" id="{AD81B1B7-0932-4D4D-B84E-BE67790EA0DD}"/>
-              </a:ext>
-            </a:extLst>
-          </p:cNvPr>
-          <p:cNvSpPr>
-            <a:spLocks noGrp="1"/>
-          </p:cNvSpPr>
-          <p:nvPr>
-            <p:ph idx="1"/>
+          <p:cNvPr id="4" name="Content Placeholder 3">
+            <a:extLst>
+              <a:ext uri="{FF2B5EF4-FFF2-40B4-BE49-F238E27FC236}">
+                <a16:creationId xmlns:a16="http://schemas.microsoft.com/office/drawing/2014/main" id="{CB813A08-CDD0-4CD8-9DEA-8EECD8AA7A4E}"/>
+              </a:ext>
+            </a:extLst>
+          </p:cNvPr>
+          <p:cNvSpPr>
+            <a:spLocks noGrp="1"/>
+          </p:cNvSpPr>
+          <p:nvPr>
+            <p:ph sz="half" idx="1"/>
           </p:nvPr>
         </p:nvSpPr>
         <p:spPr/>
@@ -3987,10 +4256,42 @@
           </a:p>
         </p:txBody>
       </p:sp>
+      <p:pic>
+        <p:nvPicPr>
+          <p:cNvPr id="6" name="Content Placeholder 5">
+            <a:extLst>
+              <a:ext uri="{FF2B5EF4-FFF2-40B4-BE49-F238E27FC236}">
+                <a16:creationId xmlns:a16="http://schemas.microsoft.com/office/drawing/2014/main" id="{0EE45835-86D9-44A8-87C1-C98F1206C916}"/>
+              </a:ext>
+            </a:extLst>
+          </p:cNvPr>
+          <p:cNvPicPr>
+            <a:picLocks noGrp="1" noChangeAspect="1"/>
+          </p:cNvPicPr>
+          <p:nvPr>
+            <p:ph sz="half" idx="2"/>
+          </p:nvPr>
+        </p:nvPicPr>
+        <p:blipFill>
+          <a:blip r:embed="rId2"/>
+          <a:stretch>
+            <a:fillRect/>
+          </a:stretch>
+        </p:blipFill>
+        <p:spPr>
+          <a:xfrm>
+            <a:off x="6524510" y="1956489"/>
+            <a:ext cx="4476980" cy="4089610"/>
+          </a:xfrm>
+          <a:prstGeom prst="rect">
+            <a:avLst/>
+          </a:prstGeom>
+        </p:spPr>
+      </p:pic>
     </p:spTree>
     <p:extLst>
       <p:ext uri="{BB962C8B-B14F-4D97-AF65-F5344CB8AC3E}">
-        <p14:creationId xmlns:p14="http://schemas.microsoft.com/office/powerpoint/2010/main" val="2680564029"/>
+        <p14:creationId xmlns:p14="http://schemas.microsoft.com/office/powerpoint/2010/main" val="3774821681"/>
       </p:ext>
     </p:extLst>
   </p:cSld>
@@ -4022,7 +4323,7 @@
           <p:cNvPr id="2" name="Title 1">
             <a:extLst>
               <a:ext uri="{FF2B5EF4-FFF2-40B4-BE49-F238E27FC236}">
-                <a16:creationId xmlns:a16="http://schemas.microsoft.com/office/drawing/2014/main" id="{6D197DFC-E19D-4B66-BF03-72931CA01CCA}"/>
+                <a16:creationId xmlns:a16="http://schemas.microsoft.com/office/drawing/2014/main" id="{D090E0CA-8DC1-4B67-B661-E218171760E9}"/>
               </a:ext>
             </a:extLst>
           </p:cNvPr>
@@ -4042,7 +4343,7 @@
           <a:p>
             <a:r>
               <a:rPr lang="en-IN" b="1" dirty="0"/>
-              <a:t>Data Understanding</a:t>
+              <a:t>Business Objectives</a:t>
             </a:r>
             <a:endParaRPr lang="en-IN" dirty="0"/>
           </a:p>
@@ -4053,7 +4354,7 @@
           <p:cNvPr id="3" name="Content Placeholder 2">
             <a:extLst>
               <a:ext uri="{FF2B5EF4-FFF2-40B4-BE49-F238E27FC236}">
-                <a16:creationId xmlns:a16="http://schemas.microsoft.com/office/drawing/2014/main" id="{CCCE091A-E539-410F-8277-A237B098F8AC}"/>
+                <a16:creationId xmlns:a16="http://schemas.microsoft.com/office/drawing/2014/main" id="{AD81B1B7-0932-4D4D-B84E-BE67790EA0DD}"/>
               </a:ext>
             </a:extLst>
           </p:cNvPr>
@@ -4066,17 +4367,67 @@
         </p:nvSpPr>
         <p:spPr/>
         <p:txBody>
-          <a:bodyPr/>
-          <a:lstStyle/>
-          <a:p>
-            <a:endParaRPr lang="en-IN"/>
+          <a:bodyPr>
+            <a:normAutofit fontScale="92500" lnSpcReduction="20000"/>
+          </a:bodyPr>
+          <a:lstStyle/>
+          <a:p>
+            <a:r>
+              <a:rPr lang="en-US" dirty="0"/>
+              <a:t>This case study aims to identify patterns which indicate if a client has difficulty paying their installments.</a:t>
+            </a:r>
+          </a:p>
+          <a:p>
+            <a:r>
+              <a:rPr lang="en-US" dirty="0"/>
+              <a:t>These patterns may be used for taking actions such as </a:t>
+            </a:r>
+          </a:p>
+          <a:p>
+            <a:pPr lvl="1"/>
+            <a:r>
+              <a:rPr lang="en-US" dirty="0"/>
+              <a:t>denying the loan</a:t>
+            </a:r>
+          </a:p>
+          <a:p>
+            <a:pPr lvl="1"/>
+            <a:r>
+              <a:rPr lang="en-US" dirty="0"/>
+              <a:t>reducing the amount of loan</a:t>
+            </a:r>
+          </a:p>
+          <a:p>
+            <a:pPr lvl="1"/>
+            <a:r>
+              <a:rPr lang="en-US" dirty="0"/>
+              <a:t>lending (to risky applicants) at a higher interest rate, etc. </a:t>
+            </a:r>
+          </a:p>
+          <a:p>
+            <a:r>
+              <a:rPr lang="en-US" dirty="0"/>
+              <a:t>This will ensure that the consumers capable of repaying the loan are not rejected. </a:t>
+            </a:r>
+          </a:p>
+          <a:p>
+            <a:r>
+              <a:rPr lang="en-US" dirty="0"/>
+              <a:t>Identification of such applicants using EDA is the aim of this case study.</a:t>
+            </a:r>
+          </a:p>
+          <a:p>
+            <a:r>
+              <a:rPr lang="en-US" dirty="0"/>
+              <a:t>Company wants to understand the driving factors (or driver variables) behind loan default, i.e. the variables which are strong indicators of default.  </a:t>
+            </a:r>
           </a:p>
         </p:txBody>
       </p:sp>
     </p:spTree>
     <p:extLst>
       <p:ext uri="{BB962C8B-B14F-4D97-AF65-F5344CB8AC3E}">
-        <p14:creationId xmlns:p14="http://schemas.microsoft.com/office/powerpoint/2010/main" val="2632317425"/>
+        <p14:creationId xmlns:p14="http://schemas.microsoft.com/office/powerpoint/2010/main" val="1920531417"/>
       </p:ext>
     </p:extLst>
   </p:cSld>
@@ -4108,7 +4459,7 @@
           <p:cNvPr id="2" name="Title 1">
             <a:extLst>
               <a:ext uri="{FF2B5EF4-FFF2-40B4-BE49-F238E27FC236}">
-                <a16:creationId xmlns:a16="http://schemas.microsoft.com/office/drawing/2014/main" id="{B5F00017-B036-494B-A700-65F15323E2EF}"/>
+                <a16:creationId xmlns:a16="http://schemas.microsoft.com/office/drawing/2014/main" id="{6D197DFC-E19D-4B66-BF03-72931CA01CCA}"/>
               </a:ext>
             </a:extLst>
           </p:cNvPr>
@@ -4121,13 +4472,16 @@
         </p:nvSpPr>
         <p:spPr/>
         <p:txBody>
-          <a:bodyPr/>
+          <a:bodyPr>
+            <a:normAutofit/>
+          </a:bodyPr>
           <a:lstStyle/>
           <a:p>
             <a:r>
               <a:rPr lang="en-IN" b="1" dirty="0"/>
-              <a:t>Data Cleaning</a:t>
-            </a:r>
+              <a:t>Data Understanding</a:t>
+            </a:r>
+            <a:endParaRPr lang="en-IN" dirty="0"/>
           </a:p>
         </p:txBody>
       </p:sp>
@@ -4136,7 +4490,7 @@
           <p:cNvPr id="3" name="Content Placeholder 2">
             <a:extLst>
               <a:ext uri="{FF2B5EF4-FFF2-40B4-BE49-F238E27FC236}">
-                <a16:creationId xmlns:a16="http://schemas.microsoft.com/office/drawing/2014/main" id="{B3CDC5F8-9D16-4FAF-9DE5-C2BF98B37249}"/>
+                <a16:creationId xmlns:a16="http://schemas.microsoft.com/office/drawing/2014/main" id="{CCCE091A-E539-410F-8277-A237B098F8AC}"/>
               </a:ext>
             </a:extLst>
           </p:cNvPr>
@@ -4149,17 +4503,96 @@
         </p:nvSpPr>
         <p:spPr/>
         <p:txBody>
-          <a:bodyPr/>
-          <a:lstStyle/>
-          <a:p>
-            <a:endParaRPr lang="en-IN"/>
+          <a:bodyPr>
+            <a:normAutofit lnSpcReduction="10000"/>
+          </a:bodyPr>
+          <a:lstStyle/>
+          <a:p>
+            <a:pPr marL="0" indent="0">
+              <a:buNone/>
+            </a:pPr>
+            <a:r>
+              <a:rPr lang="en-US" i="1" dirty="0"/>
+              <a:t>1. 'application_data.csv'</a:t>
+            </a:r>
+            <a:r>
+              <a:rPr lang="en-US" dirty="0"/>
+              <a:t>  contains all the information of the client at the time of application.</a:t>
+            </a:r>
+            <a:br>
+              <a:rPr lang="en-US" dirty="0"/>
+            </a:br>
+            <a:r>
+              <a:rPr lang="en-US" dirty="0"/>
+              <a:t>The data is about whether a </a:t>
+            </a:r>
+            <a:r>
+              <a:rPr lang="en-US" b="1" dirty="0"/>
+              <a:t>client has payment difficulties.</a:t>
+            </a:r>
+            <a:endParaRPr lang="en-US" dirty="0"/>
+          </a:p>
+          <a:p>
+            <a:pPr marL="0" indent="0">
+              <a:buNone/>
+            </a:pPr>
+            <a:r>
+              <a:rPr lang="en-US" dirty="0"/>
+              <a:t> </a:t>
+            </a:r>
+          </a:p>
+          <a:p>
+            <a:pPr marL="0" indent="0">
+              <a:buNone/>
+            </a:pPr>
+            <a:r>
+              <a:rPr lang="en-US" i="1" dirty="0"/>
+              <a:t>2. 'previous_application.csv' </a:t>
+            </a:r>
+            <a:r>
+              <a:rPr lang="en-US" dirty="0"/>
+              <a:t>contains information about the client’s previous loan data. It contains the data whether the previous application had been </a:t>
+            </a:r>
+            <a:r>
+              <a:rPr lang="en-US" b="1" dirty="0"/>
+              <a:t>Approved, Cancelled, Refused or Unused offer.</a:t>
+            </a:r>
+            <a:endParaRPr lang="en-US" dirty="0"/>
+          </a:p>
+          <a:p>
+            <a:pPr marL="0" indent="0">
+              <a:buNone/>
+            </a:pPr>
+            <a:r>
+              <a:rPr lang="en-US" dirty="0"/>
+              <a:t> </a:t>
+            </a:r>
+          </a:p>
+          <a:p>
+            <a:pPr marL="0" indent="0">
+              <a:buNone/>
+            </a:pPr>
+            <a:r>
+              <a:rPr lang="en-US" i="1" dirty="0"/>
+              <a:t>3. 'columns_description.csv'</a:t>
+            </a:r>
+            <a:r>
+              <a:rPr lang="en-US" dirty="0"/>
+              <a:t> is data dictionary which describes the meaning of the variables.</a:t>
+            </a:r>
+          </a:p>
+          <a:p>
+            <a:pPr marL="0" indent="0">
+              <a:buNone/>
+            </a:pPr>
+            <a:endParaRPr lang="en-IN" dirty="0"/>
           </a:p>
         </p:txBody>
       </p:sp>
     </p:spTree>
     <p:extLst>
       <p:ext uri="{BB962C8B-B14F-4D97-AF65-F5344CB8AC3E}">
-        <p14:creationId xmlns:p14="http://schemas.microsoft.com/office/powerpoint/2010/main" val="3680990334"/>
+        <p14:creationId xmlns:p14="http://schemas.microsoft.com/office/powerpoint/2010/main" val="2632317425"/>
       </p:ext>
     </p:extLst>
   </p:cSld>
@@ -4191,7 +4624,7 @@
           <p:cNvPr id="2" name="Title 1">
             <a:extLst>
               <a:ext uri="{FF2B5EF4-FFF2-40B4-BE49-F238E27FC236}">
-                <a16:creationId xmlns:a16="http://schemas.microsoft.com/office/drawing/2014/main" id="{9E97E4FA-6C9D-4FC8-A3E4-05BAD9129AD8}"/>
+                <a16:creationId xmlns:a16="http://schemas.microsoft.com/office/drawing/2014/main" id="{6D197DFC-E19D-4B66-BF03-72931CA01CCA}"/>
               </a:ext>
             </a:extLst>
           </p:cNvPr>
@@ -4204,22 +4637,25 @@
         </p:nvSpPr>
         <p:spPr/>
         <p:txBody>
-          <a:bodyPr/>
+          <a:bodyPr>
+            <a:normAutofit/>
+          </a:bodyPr>
           <a:lstStyle/>
           <a:p>
             <a:r>
               <a:rPr lang="en-IN" b="1" dirty="0"/>
-              <a:t>Data Manipulation</a:t>
-            </a:r>
-          </a:p>
-        </p:txBody>
-      </p:sp>
-      <p:sp>
-        <p:nvSpPr>
-          <p:cNvPr id="3" name="Content Placeholder 2">
-            <a:extLst>
-              <a:ext uri="{FF2B5EF4-FFF2-40B4-BE49-F238E27FC236}">
-                <a16:creationId xmlns:a16="http://schemas.microsoft.com/office/drawing/2014/main" id="{AB0C8FFC-F326-4935-A7A5-ACADB948BFE6}"/>
+              <a:t>Data Understanding</a:t>
+            </a:r>
+            <a:endParaRPr lang="en-IN" dirty="0"/>
+          </a:p>
+        </p:txBody>
+      </p:sp>
+      <p:sp>
+        <p:nvSpPr>
+          <p:cNvPr id="6" name="Content Placeholder 5">
+            <a:extLst>
+              <a:ext uri="{FF2B5EF4-FFF2-40B4-BE49-F238E27FC236}">
+                <a16:creationId xmlns:a16="http://schemas.microsoft.com/office/drawing/2014/main" id="{4F85CF6B-336A-42B0-A3F1-40289BF6EAD7}"/>
               </a:ext>
             </a:extLst>
           </p:cNvPr>
@@ -4235,14 +4671,20 @@
           <a:bodyPr/>
           <a:lstStyle/>
           <a:p>
-            <a:endParaRPr lang="en-IN"/>
+            <a:r>
+              <a:rPr lang="en-IN" dirty="0">
+                <a:hlinkClick r:id="rId2"/>
+              </a:rPr>
+              <a:t>https://drive.google.com/drive/folders/1PZxGcQVdEZHlaxwXo88WiJYy6_0SoJRQ</a:t>
+            </a:r>
+            <a:endParaRPr lang="en-IN" dirty="0"/>
           </a:p>
         </p:txBody>
       </p:sp>
     </p:spTree>
     <p:extLst>
       <p:ext uri="{BB962C8B-B14F-4D97-AF65-F5344CB8AC3E}">
-        <p14:creationId xmlns:p14="http://schemas.microsoft.com/office/powerpoint/2010/main" val="386510639"/>
+        <p14:creationId xmlns:p14="http://schemas.microsoft.com/office/powerpoint/2010/main" val="746104444"/>
       </p:ext>
     </p:extLst>
   </p:cSld>
@@ -4274,7 +4716,7 @@
           <p:cNvPr id="2" name="Title 1">
             <a:extLst>
               <a:ext uri="{FF2B5EF4-FFF2-40B4-BE49-F238E27FC236}">
-                <a16:creationId xmlns:a16="http://schemas.microsoft.com/office/drawing/2014/main" id="{9E97E4FA-6C9D-4FC8-A3E4-05BAD9129AD8}"/>
+                <a16:creationId xmlns:a16="http://schemas.microsoft.com/office/drawing/2014/main" id="{B5F00017-B036-494B-A700-65F15323E2EF}"/>
               </a:ext>
             </a:extLst>
           </p:cNvPr>
@@ -4292,7 +4734,7 @@
           <a:p>
             <a:r>
               <a:rPr lang="en-IN" b="1" dirty="0"/>
-              <a:t>Handling Missing Values</a:t>
+              <a:t>Data Cleaning</a:t>
             </a:r>
           </a:p>
         </p:txBody>
@@ -4302,7 +4744,7 @@
           <p:cNvPr id="3" name="Content Placeholder 2">
             <a:extLst>
               <a:ext uri="{FF2B5EF4-FFF2-40B4-BE49-F238E27FC236}">
-                <a16:creationId xmlns:a16="http://schemas.microsoft.com/office/drawing/2014/main" id="{AB0C8FFC-F326-4935-A7A5-ACADB948BFE6}"/>
+                <a16:creationId xmlns:a16="http://schemas.microsoft.com/office/drawing/2014/main" id="{B3CDC5F8-9D16-4FAF-9DE5-C2BF98B37249}"/>
               </a:ext>
             </a:extLst>
           </p:cNvPr>
@@ -4325,7 +4767,7 @@
     </p:spTree>
     <p:extLst>
       <p:ext uri="{BB962C8B-B14F-4D97-AF65-F5344CB8AC3E}">
-        <p14:creationId xmlns:p14="http://schemas.microsoft.com/office/powerpoint/2010/main" val="4023465001"/>
+        <p14:creationId xmlns:p14="http://schemas.microsoft.com/office/powerpoint/2010/main" val="3680990334"/>
       </p:ext>
     </p:extLst>
   </p:cSld>
@@ -4357,7 +4799,7 @@
           <p:cNvPr id="2" name="Title 1">
             <a:extLst>
               <a:ext uri="{FF2B5EF4-FFF2-40B4-BE49-F238E27FC236}">
-                <a16:creationId xmlns:a16="http://schemas.microsoft.com/office/drawing/2014/main" id="{A25CEBA9-6D34-432E-9ACE-755890EE221B}"/>
+                <a16:creationId xmlns:a16="http://schemas.microsoft.com/office/drawing/2014/main" id="{9E97E4FA-6C9D-4FC8-A3E4-05BAD9129AD8}"/>
               </a:ext>
             </a:extLst>
           </p:cNvPr>
@@ -4375,7 +4817,7 @@
           <a:p>
             <a:r>
               <a:rPr lang="en-IN" b="1" dirty="0"/>
-              <a:t>Handling Outliers</a:t>
+              <a:t>Data Manipulation</a:t>
             </a:r>
           </a:p>
         </p:txBody>
@@ -4385,7 +4827,7 @@
           <p:cNvPr id="3" name="Content Placeholder 2">
             <a:extLst>
               <a:ext uri="{FF2B5EF4-FFF2-40B4-BE49-F238E27FC236}">
-                <a16:creationId xmlns:a16="http://schemas.microsoft.com/office/drawing/2014/main" id="{D1B3FFF8-53B2-4343-AEA2-D3E4EEDFAECF}"/>
+                <a16:creationId xmlns:a16="http://schemas.microsoft.com/office/drawing/2014/main" id="{AB0C8FFC-F326-4935-A7A5-ACADB948BFE6}"/>
               </a:ext>
             </a:extLst>
           </p:cNvPr>
@@ -4408,7 +4850,7 @@
     </p:spTree>
     <p:extLst>
       <p:ext uri="{BB962C8B-B14F-4D97-AF65-F5344CB8AC3E}">
-        <p14:creationId xmlns:p14="http://schemas.microsoft.com/office/powerpoint/2010/main" val="1382689733"/>
+        <p14:creationId xmlns:p14="http://schemas.microsoft.com/office/powerpoint/2010/main" val="386510639"/>
       </p:ext>
     </p:extLst>
   </p:cSld>
@@ -4440,7 +4882,7 @@
           <p:cNvPr id="2" name="Title 1">
             <a:extLst>
               <a:ext uri="{FF2B5EF4-FFF2-40B4-BE49-F238E27FC236}">
-                <a16:creationId xmlns:a16="http://schemas.microsoft.com/office/drawing/2014/main" id="{12D99B56-5A3D-4D2C-A097-8AB57861B845}"/>
+                <a16:creationId xmlns:a16="http://schemas.microsoft.com/office/drawing/2014/main" id="{9E97E4FA-6C9D-4FC8-A3E4-05BAD9129AD8}"/>
               </a:ext>
             </a:extLst>
           </p:cNvPr>
@@ -4458,7 +4900,7 @@
           <a:p>
             <a:r>
               <a:rPr lang="en-IN" b="1" dirty="0"/>
-              <a:t>Data Imbalance</a:t>
+              <a:t>Handling Missing Values</a:t>
             </a:r>
           </a:p>
         </p:txBody>
@@ -4468,7 +4910,7 @@
           <p:cNvPr id="3" name="Content Placeholder 2">
             <a:extLst>
               <a:ext uri="{FF2B5EF4-FFF2-40B4-BE49-F238E27FC236}">
-                <a16:creationId xmlns:a16="http://schemas.microsoft.com/office/drawing/2014/main" id="{D915CF85-E928-42A0-BB1E-F923A43875BB}"/>
+                <a16:creationId xmlns:a16="http://schemas.microsoft.com/office/drawing/2014/main" id="{AB0C8FFC-F326-4935-A7A5-ACADB948BFE6}"/>
               </a:ext>
             </a:extLst>
           </p:cNvPr>
@@ -4491,7 +4933,7 @@
     </p:spTree>
     <p:extLst>
       <p:ext uri="{BB962C8B-B14F-4D97-AF65-F5344CB8AC3E}">
-        <p14:creationId xmlns:p14="http://schemas.microsoft.com/office/powerpoint/2010/main" val="2842010195"/>
+        <p14:creationId xmlns:p14="http://schemas.microsoft.com/office/powerpoint/2010/main" val="4023465001"/>
       </p:ext>
     </p:extLst>
   </p:cSld>

</xml_diff>